<commit_message>
Revisión Inicial Semana 1 con Carolina
Incluye primera sesión de revisión e incorporación de comentarios a la semana 1.
</commit_message>
<xml_diff>
--- a/18-data-visualization/Contenido Semana 1/1.3. Presentación - Formulación de las Preguntas.pptx
+++ b/18-data-visualization/Contenido Semana 1/1.3. Presentación - Formulación de las Preguntas.pptx
@@ -5,38 +5,39 @@
     <p:sldMasterId id="2147483670" r:id="rId1"/>
   </p:sldMasterIdLst>
   <p:notesMasterIdLst>
-    <p:notesMasterId r:id="rId7"/>
+    <p:notesMasterId r:id="rId8"/>
   </p:notesMasterIdLst>
   <p:sldIdLst>
     <p:sldId id="282" r:id="rId2"/>
     <p:sldId id="284" r:id="rId3"/>
-    <p:sldId id="283" r:id="rId4"/>
+    <p:sldId id="287" r:id="rId4"/>
     <p:sldId id="285" r:id="rId5"/>
-    <p:sldId id="286" r:id="rId6"/>
+    <p:sldId id="283" r:id="rId6"/>
+    <p:sldId id="286" r:id="rId7"/>
   </p:sldIdLst>
   <p:sldSz cx="9144000" cy="6858000" type="screen4x3"/>
   <p:notesSz cx="6858000" cy="9144000"/>
   <p:embeddedFontLst>
     <p:embeddedFont>
       <p:font typeface="Calibri" panose="020F0502020204030204" pitchFamily="34" charset="0"/>
-      <p:regular r:id="rId8"/>
-      <p:bold r:id="rId9"/>
-      <p:italic r:id="rId10"/>
-      <p:boldItalic r:id="rId11"/>
+      <p:regular r:id="rId9"/>
+      <p:bold r:id="rId10"/>
+      <p:italic r:id="rId11"/>
+      <p:boldItalic r:id="rId12"/>
+    </p:embeddedFont>
+    <p:embeddedFont>
+      <p:font typeface="Raleway" panose="020B0604020202020204" charset="0"/>
+      <p:regular r:id="rId13"/>
+      <p:bold r:id="rId14"/>
+      <p:italic r:id="rId15"/>
+      <p:boldItalic r:id="rId16"/>
     </p:embeddedFont>
     <p:embeddedFont>
       <p:font typeface="Montserrat" panose="020B0604020202020204" charset="0"/>
-      <p:regular r:id="rId12"/>
-      <p:bold r:id="rId13"/>
-      <p:italic r:id="rId14"/>
-      <p:boldItalic r:id="rId15"/>
-    </p:embeddedFont>
-    <p:embeddedFont>
-      <p:font typeface="Raleway" panose="020B0604020202020204" charset="0"/>
-      <p:regular r:id="rId16"/>
-      <p:bold r:id="rId17"/>
-      <p:italic r:id="rId18"/>
-      <p:boldItalic r:id="rId19"/>
+      <p:regular r:id="rId17"/>
+      <p:bold r:id="rId18"/>
+      <p:italic r:id="rId19"/>
+      <p:boldItalic r:id="rId20"/>
     </p:embeddedFont>
   </p:embeddedFontLst>
   <p:defaultTextStyle>
@@ -1427,7 +1428,7 @@
     </p:spTree>
     <p:extLst>
       <p:ext uri="{BB962C8B-B14F-4D97-AF65-F5344CB8AC3E}">
-        <p14:creationId xmlns:p14="http://schemas.microsoft.com/office/powerpoint/2010/main" val="2512471417"/>
+        <p14:creationId xmlns:p14="http://schemas.microsoft.com/office/powerpoint/2010/main" val="2791080441"/>
       </p:ext>
     </p:extLst>
   </p:cSld>
@@ -1544,6 +1545,112 @@
 </file>
 
 <file path=ppt/notesSlides/notesSlide5.xml><?xml version="1.0" encoding="utf-8"?>
+<p:notes xmlns:a="http://schemas.openxmlformats.org/drawingml/2006/main" xmlns:r="http://schemas.openxmlformats.org/officeDocument/2006/relationships" xmlns:p="http://schemas.openxmlformats.org/presentationml/2006/main" showMasterSp="0" showMasterPhAnim="0">
+  <p:cSld>
+    <p:spTree>
+      <p:nvGrpSpPr>
+        <p:cNvPr id="1" name="Shape 389"/>
+        <p:cNvGrpSpPr/>
+        <p:nvPr/>
+      </p:nvGrpSpPr>
+      <p:grpSpPr>
+        <a:xfrm>
+          <a:off x="0" y="0"/>
+          <a:ext cx="0" cy="0"/>
+          <a:chOff x="0" y="0"/>
+          <a:chExt cx="0" cy="0"/>
+        </a:xfrm>
+      </p:grpSpPr>
+      <p:sp>
+        <p:nvSpPr>
+          <p:cNvPr id="390" name="Shape 390"/>
+          <p:cNvSpPr txBox="1">
+            <a:spLocks noGrp="1"/>
+          </p:cNvSpPr>
+          <p:nvPr>
+            <p:ph type="body" idx="1"/>
+          </p:nvPr>
+        </p:nvSpPr>
+        <p:spPr>
+          <a:xfrm>
+            <a:off x="685800" y="4343400"/>
+            <a:ext cx="5486400" cy="4114800"/>
+          </a:xfrm>
+          <a:prstGeom prst="rect">
+            <a:avLst/>
+          </a:prstGeom>
+        </p:spPr>
+        <p:txBody>
+          <a:bodyPr lIns="91425" tIns="91425" rIns="91425" bIns="91425" anchor="t" anchorCtr="0">
+            <a:noAutofit/>
+          </a:bodyPr>
+          <a:lstStyle/>
+          <a:p>
+            <a:pPr lvl="0">
+              <a:spcBef>
+                <a:spcPts val="0"/>
+              </a:spcBef>
+              <a:buNone/>
+            </a:pPr>
+            <a:endParaRPr/>
+          </a:p>
+        </p:txBody>
+      </p:sp>
+      <p:sp>
+        <p:nvSpPr>
+          <p:cNvPr id="391" name="Shape 391"/>
+          <p:cNvSpPr>
+            <a:spLocks noGrp="1" noRot="1" noChangeAspect="1"/>
+          </p:cNvSpPr>
+          <p:nvPr>
+            <p:ph type="sldImg" idx="2"/>
+          </p:nvPr>
+        </p:nvSpPr>
+        <p:spPr>
+          <a:xfrm>
+            <a:off x="1143000" y="685800"/>
+            <a:ext cx="4572000" cy="3429000"/>
+          </a:xfrm>
+          <a:custGeom>
+            <a:avLst/>
+            <a:gdLst/>
+            <a:ahLst/>
+            <a:cxnLst/>
+            <a:rect l="0" t="0" r="0" b="0"/>
+            <a:pathLst>
+              <a:path w="120000" h="120000" extrusionOk="0">
+                <a:moveTo>
+                  <a:pt x="0" y="0"/>
+                </a:moveTo>
+                <a:lnTo>
+                  <a:pt x="120000" y="0"/>
+                </a:lnTo>
+                <a:lnTo>
+                  <a:pt x="120000" y="120000"/>
+                </a:lnTo>
+                <a:lnTo>
+                  <a:pt x="0" y="120000"/>
+                </a:lnTo>
+                <a:close/>
+              </a:path>
+            </a:pathLst>
+          </a:custGeom>
+        </p:spPr>
+      </p:sp>
+    </p:spTree>
+    <p:extLst>
+      <p:ext uri="{BB962C8B-B14F-4D97-AF65-F5344CB8AC3E}">
+        <p14:creationId xmlns:p14="http://schemas.microsoft.com/office/powerpoint/2010/main" val="2512471417"/>
+      </p:ext>
+    </p:extLst>
+  </p:cSld>
+  <p:clrMapOvr>
+    <a:masterClrMapping/>
+  </p:clrMapOvr>
+</p:notes>
+</file>
+
+<file path=ppt/notesSlides/notesSlide6.xml><?xml version="1.0" encoding="utf-8"?>
 <p:notes xmlns:a="http://schemas.openxmlformats.org/drawingml/2006/main" xmlns:r="http://schemas.openxmlformats.org/officeDocument/2006/relationships" xmlns:p="http://schemas.openxmlformats.org/presentationml/2006/main" showMasterSp="0" showMasterPhAnim="0">
   <p:cSld>
     <p:spTree>
@@ -11085,114 +11192,6 @@
       </p:grpSpPr>
       <p:sp>
         <p:nvSpPr>
-          <p:cNvPr id="20" name="Arrow: Right 19">
-            <a:extLst>
-              <a:ext uri="{FF2B5EF4-FFF2-40B4-BE49-F238E27FC236}">
-                <a16:creationId xmlns:a16="http://schemas.microsoft.com/office/drawing/2014/main" id="{52C69933-8020-40FB-B8BE-4F0CB57DFF0A}"/>
-              </a:ext>
-            </a:extLst>
-          </p:cNvPr>
-          <p:cNvSpPr/>
-          <p:nvPr/>
-        </p:nvSpPr>
-        <p:spPr>
-          <a:xfrm rot="5400000">
-            <a:off x="3462116" y="4571871"/>
-            <a:ext cx="1979371" cy="744717"/>
-          </a:xfrm>
-          <a:prstGeom prst="rightArrow">
-            <a:avLst/>
-          </a:prstGeom>
-          <a:solidFill>
-            <a:srgbClr val="2B2B2B"/>
-          </a:solidFill>
-          <a:ln>
-            <a:solidFill>
-              <a:srgbClr val="2B2B2B"/>
-            </a:solidFill>
-          </a:ln>
-        </p:spPr>
-        <p:style>
-          <a:lnRef idx="2">
-            <a:schemeClr val="accent1">
-              <a:shade val="50000"/>
-            </a:schemeClr>
-          </a:lnRef>
-          <a:fillRef idx="1">
-            <a:schemeClr val="accent1"/>
-          </a:fillRef>
-          <a:effectRef idx="0">
-            <a:schemeClr val="accent1"/>
-          </a:effectRef>
-          <a:fontRef idx="minor">
-            <a:schemeClr val="lt1"/>
-          </a:fontRef>
-        </p:style>
-        <p:txBody>
-          <a:bodyPr rtlCol="0" anchor="ctr"/>
-          <a:lstStyle/>
-          <a:p>
-            <a:pPr algn="ctr"/>
-            <a:endParaRPr lang="en-US"/>
-          </a:p>
-        </p:txBody>
-      </p:sp>
-      <p:sp>
-        <p:nvSpPr>
-          <p:cNvPr id="17" name="Arrow: Right 16">
-            <a:extLst>
-              <a:ext uri="{FF2B5EF4-FFF2-40B4-BE49-F238E27FC236}">
-                <a16:creationId xmlns:a16="http://schemas.microsoft.com/office/drawing/2014/main" id="{2952BF84-8BBC-44BF-804E-284292C55931}"/>
-              </a:ext>
-            </a:extLst>
-          </p:cNvPr>
-          <p:cNvSpPr/>
-          <p:nvPr/>
-        </p:nvSpPr>
-        <p:spPr>
-          <a:xfrm>
-            <a:off x="2941163" y="2081495"/>
-            <a:ext cx="3205113" cy="744717"/>
-          </a:xfrm>
-          <a:prstGeom prst="rightArrow">
-            <a:avLst/>
-          </a:prstGeom>
-          <a:solidFill>
-            <a:srgbClr val="2B2B2B"/>
-          </a:solidFill>
-          <a:ln>
-            <a:solidFill>
-              <a:srgbClr val="2B2B2B"/>
-            </a:solidFill>
-          </a:ln>
-        </p:spPr>
-        <p:style>
-          <a:lnRef idx="2">
-            <a:schemeClr val="accent1">
-              <a:shade val="50000"/>
-            </a:schemeClr>
-          </a:lnRef>
-          <a:fillRef idx="1">
-            <a:schemeClr val="accent1"/>
-          </a:fillRef>
-          <a:effectRef idx="0">
-            <a:schemeClr val="accent1"/>
-          </a:effectRef>
-          <a:fontRef idx="minor">
-            <a:schemeClr val="lt1"/>
-          </a:fontRef>
-        </p:style>
-        <p:txBody>
-          <a:bodyPr rtlCol="0" anchor="ctr"/>
-          <a:lstStyle/>
-          <a:p>
-            <a:pPr algn="ctr"/>
-            <a:endParaRPr lang="en-US"/>
-          </a:p>
-        </p:txBody>
-      </p:sp>
-      <p:sp>
-        <p:nvSpPr>
           <p:cNvPr id="394" name="Shape 394"/>
           <p:cNvSpPr txBox="1">
             <a:spLocks noGrp="1"/>
@@ -11220,16 +11219,11 @@
           </a:bodyPr>
           <a:lstStyle/>
           <a:p>
-            <a:pPr marL="0" marR="0" lvl="0" indent="0" algn="l" rtl="0">
-              <a:spcBef>
-                <a:spcPts val="0"/>
-              </a:spcBef>
+            <a:pPr lvl="0" algn="l">
               <a:buClr>
                 <a:srgbClr val="F7B600"/>
               </a:buClr>
               <a:buSzPct val="25000"/>
-              <a:buFont typeface="Arial"/>
-              <a:buNone/>
             </a:pPr>
             <a:r>
               <a:rPr lang="es-VE" sz="1200" dirty="0">
@@ -11253,8 +11247,29 @@
                 <a:cs typeface="Montserrat"/>
                 <a:sym typeface="Montserrat"/>
               </a:rPr>
-              <a:t>.3 Formulación de la Pregunta</a:t>
+              <a:t>.3 </a:t>
             </a:r>
+            <a:r>
+              <a:rPr lang="es-VE" sz="1200" dirty="0">
+                <a:solidFill>
+                  <a:srgbClr val="F7B600"/>
+                </a:solidFill>
+                <a:latin typeface="Montserrat"/>
+                <a:ea typeface="Montserrat"/>
+                <a:cs typeface="Montserrat"/>
+                <a:sym typeface="Montserrat"/>
+              </a:rPr>
+              <a:t>Formulación de la Pregunta</a:t>
+            </a:r>
+            <a:endParaRPr lang="es-VE" sz="1200" i="0" u="none" strike="noStrike" cap="none" dirty="0">
+              <a:solidFill>
+                <a:srgbClr val="F7B600"/>
+              </a:solidFill>
+              <a:latin typeface="Montserrat"/>
+              <a:ea typeface="Montserrat"/>
+              <a:cs typeface="Montserrat"/>
+              <a:sym typeface="Montserrat"/>
+            </a:endParaRPr>
           </a:p>
         </p:txBody>
       </p:sp>
@@ -11293,8 +11308,8 @@
         </p:nvSpPr>
         <p:spPr>
           <a:xfrm>
-            <a:off x="1117077" y="674182"/>
-            <a:ext cx="7107810" cy="646200"/>
+            <a:off x="457200" y="674182"/>
+            <a:ext cx="8309728" cy="646200"/>
           </a:xfrm>
           <a:prstGeom prst="rect">
             <a:avLst/>
@@ -11318,7 +11333,7 @@
               <a:buNone/>
             </a:pPr>
             <a:r>
-              <a:rPr lang="es-GT" sz="3600" dirty="0">
+              <a:rPr lang="es-VE" sz="3600" dirty="0">
                 <a:solidFill>
                   <a:srgbClr val="F7B600"/>
                 </a:solidFill>
@@ -11327,29 +11342,26 @@
                 <a:cs typeface="Raleway"/>
                 <a:sym typeface="Raleway"/>
               </a:rPr>
-              <a:t>¿</a:t>
+              <a:t>Recordemos el Árbol de Problemas</a:t>
             </a:r>
-            <a:r>
-              <a:rPr lang="es-GT" sz="3600" b="0" i="0" u="none" strike="noStrike" cap="none" dirty="0">
-                <a:solidFill>
-                  <a:srgbClr val="F7B600"/>
-                </a:solidFill>
-                <a:latin typeface="Raleway"/>
-                <a:ea typeface="Raleway"/>
-                <a:cs typeface="Raleway"/>
-                <a:sym typeface="Raleway"/>
-              </a:rPr>
-              <a:t>Cómo formular la pregunta?</a:t>
-            </a:r>
+            <a:endParaRPr lang="es-GT" sz="3600" b="0" i="0" u="none" strike="noStrike" cap="none" dirty="0">
+              <a:solidFill>
+                <a:srgbClr val="F7B600"/>
+              </a:solidFill>
+              <a:latin typeface="Raleway"/>
+              <a:ea typeface="Raleway"/>
+              <a:cs typeface="Raleway"/>
+              <a:sym typeface="Raleway"/>
+            </a:endParaRPr>
           </a:p>
         </p:txBody>
       </p:sp>
       <p:sp>
         <p:nvSpPr>
-          <p:cNvPr id="12" name="TextBox 11">
+          <p:cNvPr id="2" name="TextBox 1">
             <a:extLst>
               <a:ext uri="{FF2B5EF4-FFF2-40B4-BE49-F238E27FC236}">
-                <a16:creationId xmlns:a16="http://schemas.microsoft.com/office/drawing/2014/main" id="{2609CE3E-E741-4F5A-BE89-CF17541F2D1B}"/>
+                <a16:creationId xmlns:a16="http://schemas.microsoft.com/office/drawing/2014/main" id="{EAAC0740-F50F-4BF6-81BA-0705DA746833}"/>
               </a:ext>
             </a:extLst>
           </p:cNvPr>
@@ -11358,8 +11370,8 @@
         </p:nvSpPr>
         <p:spPr>
           <a:xfrm>
-            <a:off x="179587" y="2130456"/>
-            <a:ext cx="2478771" cy="707886"/>
+            <a:off x="4308047" y="3411148"/>
+            <a:ext cx="2865749" cy="954107"/>
           </a:xfrm>
           <a:prstGeom prst="rect">
             <a:avLst/>
@@ -11375,30 +11387,42 @@
           <a:lstStyle/>
           <a:p>
             <a:pPr algn="ctr"/>
-            <a:r>
-              <a:rPr lang="es-VE" sz="2000" dirty="0">
-                <a:solidFill>
-                  <a:schemeClr val="bg1"/>
-                </a:solidFill>
-                <a:latin typeface="Raleway" panose="020B0604020202020204" charset="0"/>
-              </a:rPr>
-              <a:t>Árbol de Problemas</a:t>
-            </a:r>
-            <a:endParaRPr lang="en-US" sz="2000" dirty="0">
+            <a:endParaRPr lang="es-VE" b="1" dirty="0">
               <a:solidFill>
                 <a:schemeClr val="bg1"/>
               </a:solidFill>
               <a:latin typeface="Raleway" panose="020B0604020202020204" charset="0"/>
             </a:endParaRPr>
           </a:p>
+          <a:p>
+            <a:pPr algn="ctr"/>
+            <a:r>
+              <a:rPr lang="es-VE" b="1" dirty="0">
+                <a:solidFill>
+                  <a:schemeClr val="bg1"/>
+                </a:solidFill>
+                <a:latin typeface="Raleway" panose="020B0604020202020204" charset="0"/>
+              </a:rPr>
+              <a:t>El acceso a Internet es limitado en el mundo</a:t>
+            </a:r>
+          </a:p>
+          <a:p>
+            <a:pPr algn="ctr"/>
+            <a:endParaRPr lang="en-US" b="1" dirty="0">
+              <a:solidFill>
+                <a:schemeClr val="bg1"/>
+              </a:solidFill>
+              <a:latin typeface="Raleway" panose="020B0604020202020204" charset="0"/>
+            </a:endParaRPr>
+          </a:p>
         </p:txBody>
       </p:sp>
       <p:sp>
         <p:nvSpPr>
-          <p:cNvPr id="13" name="TextBox 12">
+          <p:cNvPr id="6" name="TextBox 5">
             <a:extLst>
               <a:ext uri="{FF2B5EF4-FFF2-40B4-BE49-F238E27FC236}">
-                <a16:creationId xmlns:a16="http://schemas.microsoft.com/office/drawing/2014/main" id="{CD270FE8-0E34-42E8-9C64-4AA97E116070}"/>
+                <a16:creationId xmlns:a16="http://schemas.microsoft.com/office/drawing/2014/main" id="{5FCA4E71-9978-4B7E-809D-7D6F6239B2BC}"/>
               </a:ext>
             </a:extLst>
           </p:cNvPr>
@@ -11406,16 +11430,19 @@
           <p:nvPr/>
         </p:nvSpPr>
         <p:spPr>
-          <a:xfrm>
-            <a:off x="6572532" y="2130456"/>
-            <a:ext cx="2478771" cy="707886"/>
+          <a:xfrm flipH="1">
+            <a:off x="2406674" y="4973254"/>
+            <a:ext cx="2318161" cy="1169551"/>
           </a:xfrm>
           <a:prstGeom prst="rect">
             <a:avLst/>
           </a:prstGeom>
-          <a:solidFill>
-            <a:srgbClr val="F7B617"/>
-          </a:solidFill>
+          <a:noFill/>
+          <a:ln>
+            <a:solidFill>
+              <a:srgbClr val="2B2B2B"/>
+            </a:solidFill>
+          </a:ln>
         </p:spPr>
         <p:txBody>
           <a:bodyPr wrap="square" rtlCol="0">
@@ -11424,72 +11451,33 @@
           <a:lstStyle/>
           <a:p>
             <a:pPr algn="ctr"/>
+            <a:endParaRPr lang="es-VE" dirty="0">
+              <a:latin typeface="Raleway" panose="020B0604020202020204" charset="0"/>
+            </a:endParaRPr>
+          </a:p>
+          <a:p>
+            <a:pPr algn="ctr"/>
             <a:r>
-              <a:rPr lang="es-VE" sz="2000" dirty="0">
-                <a:solidFill>
-                  <a:schemeClr val="bg1"/>
-                </a:solidFill>
+              <a:rPr lang="es-VE" dirty="0">
                 <a:latin typeface="Raleway" panose="020B0604020202020204" charset="0"/>
               </a:rPr>
-              <a:t>Árbol de </a:t>
+              <a:t>Existen diferencias en los niveles de ingresos por país,</a:t>
             </a:r>
           </a:p>
           <a:p>
             <a:pPr algn="ctr"/>
-            <a:r>
-              <a:rPr lang="es-VE" sz="2000" dirty="0">
-                <a:solidFill>
-                  <a:schemeClr val="bg1"/>
-                </a:solidFill>
-                <a:latin typeface="Raleway" panose="020B0604020202020204" charset="0"/>
-              </a:rPr>
-              <a:t>Objetivos</a:t>
-            </a:r>
-            <a:endParaRPr lang="en-US" sz="2000" dirty="0">
-              <a:solidFill>
-                <a:schemeClr val="bg1"/>
-              </a:solidFill>
+            <a:endParaRPr lang="es-VE" dirty="0">
               <a:latin typeface="Raleway" panose="020B0604020202020204" charset="0"/>
             </a:endParaRPr>
           </a:p>
         </p:txBody>
       </p:sp>
-      <p:pic>
-        <p:nvPicPr>
-          <p:cNvPr id="9" name="Picture 8" descr="A picture containing thing&#10;&#10;Description generated with very high confidence">
+      <p:sp>
+        <p:nvSpPr>
+          <p:cNvPr id="11" name="TextBox 10">
             <a:extLst>
               <a:ext uri="{FF2B5EF4-FFF2-40B4-BE49-F238E27FC236}">
-                <a16:creationId xmlns:a16="http://schemas.microsoft.com/office/drawing/2014/main" id="{B5E32F36-C4F8-4662-885F-6A005C4F699E}"/>
-              </a:ext>
-            </a:extLst>
-          </p:cNvPr>
-          <p:cNvPicPr>
-            <a:picLocks noChangeAspect="1"/>
-          </p:cNvPicPr>
-          <p:nvPr/>
-        </p:nvPicPr>
-        <p:blipFill>
-          <a:blip r:embed="rId4"/>
-          <a:stretch>
-            <a:fillRect/>
-          </a:stretch>
-        </p:blipFill>
-        <p:spPr>
-          <a:xfrm>
-            <a:off x="3645812" y="1475295"/>
-            <a:ext cx="1611984" cy="1611984"/>
-          </a:xfrm>
-          <a:prstGeom prst="rect">
-            <a:avLst/>
-          </a:prstGeom>
-        </p:spPr>
-      </p:pic>
-      <p:sp>
-        <p:nvSpPr>
-          <p:cNvPr id="10" name="TextBox 9">
-            <a:extLst>
-              <a:ext uri="{FF2B5EF4-FFF2-40B4-BE49-F238E27FC236}">
-                <a16:creationId xmlns:a16="http://schemas.microsoft.com/office/drawing/2014/main" id="{6878E5A1-0E3B-48AE-A19A-BF1630840705}"/>
+                <a16:creationId xmlns:a16="http://schemas.microsoft.com/office/drawing/2014/main" id="{BCE33CC2-8F05-406D-8F88-E6B9EB8C13E7}"/>
               </a:ext>
             </a:extLst>
           </p:cNvPr>
@@ -11497,9 +11485,229 @@
           <p:nvPr/>
         </p:nvSpPr>
         <p:spPr>
-          <a:xfrm>
-            <a:off x="2511175" y="3120234"/>
-            <a:ext cx="4160113" cy="584775"/>
+          <a:xfrm flipH="1">
+            <a:off x="4939644" y="4993497"/>
+            <a:ext cx="1611983" cy="1169551"/>
+          </a:xfrm>
+          <a:prstGeom prst="rect">
+            <a:avLst/>
+          </a:prstGeom>
+          <a:noFill/>
+          <a:ln>
+            <a:solidFill>
+              <a:srgbClr val="2B2B2B"/>
+            </a:solidFill>
+          </a:ln>
+        </p:spPr>
+        <p:txBody>
+          <a:bodyPr wrap="square" rtlCol="0">
+            <a:spAutoFit/>
+          </a:bodyPr>
+          <a:lstStyle/>
+          <a:p>
+            <a:pPr algn="ctr"/>
+            <a:endParaRPr lang="es-VE" dirty="0">
+              <a:latin typeface="Raleway" panose="020B0604020202020204" charset="0"/>
+            </a:endParaRPr>
+          </a:p>
+          <a:p>
+            <a:pPr algn="ctr"/>
+            <a:r>
+              <a:rPr lang="es-VE" dirty="0">
+                <a:latin typeface="Raleway" panose="020B0604020202020204" charset="0"/>
+              </a:rPr>
+              <a:t>El costo de la tecnología difiere por país</a:t>
+            </a:r>
+          </a:p>
+          <a:p>
+            <a:pPr algn="ctr"/>
+            <a:endParaRPr lang="es-VE" dirty="0">
+              <a:latin typeface="Raleway" panose="020B0604020202020204" charset="0"/>
+            </a:endParaRPr>
+          </a:p>
+        </p:txBody>
+      </p:sp>
+      <p:sp>
+        <p:nvSpPr>
+          <p:cNvPr id="12" name="TextBox 11">
+            <a:extLst>
+              <a:ext uri="{FF2B5EF4-FFF2-40B4-BE49-F238E27FC236}">
+                <a16:creationId xmlns:a16="http://schemas.microsoft.com/office/drawing/2014/main" id="{B54670BF-4371-4725-B658-014911444BC2}"/>
+              </a:ext>
+            </a:extLst>
+          </p:cNvPr>
+          <p:cNvSpPr txBox="1"/>
+          <p:nvPr/>
+        </p:nvSpPr>
+        <p:spPr>
+          <a:xfrm flipH="1">
+            <a:off x="6721311" y="4973255"/>
+            <a:ext cx="2293646" cy="1169551"/>
+          </a:xfrm>
+          <a:prstGeom prst="rect">
+            <a:avLst/>
+          </a:prstGeom>
+          <a:noFill/>
+          <a:ln>
+            <a:solidFill>
+              <a:srgbClr val="2B2B2B"/>
+            </a:solidFill>
+          </a:ln>
+        </p:spPr>
+        <p:txBody>
+          <a:bodyPr wrap="square" rtlCol="0">
+            <a:spAutoFit/>
+          </a:bodyPr>
+          <a:lstStyle/>
+          <a:p>
+            <a:pPr algn="ctr"/>
+            <a:endParaRPr lang="es-VE" dirty="0">
+              <a:latin typeface="Raleway" panose="020B0604020202020204" charset="0"/>
+            </a:endParaRPr>
+          </a:p>
+          <a:p>
+            <a:pPr algn="ctr"/>
+            <a:r>
+              <a:rPr lang="es-VE" dirty="0">
+                <a:latin typeface="Raleway" panose="020B0604020202020204" charset="0"/>
+              </a:rPr>
+              <a:t>El ritmo de adopción de tecnología es más lento en unos países que otros. </a:t>
+            </a:r>
+          </a:p>
+          <a:p>
+            <a:pPr algn="ctr"/>
+            <a:endParaRPr lang="es-VE" dirty="0">
+              <a:latin typeface="Raleway" panose="020B0604020202020204" charset="0"/>
+            </a:endParaRPr>
+          </a:p>
+        </p:txBody>
+      </p:sp>
+      <p:sp>
+        <p:nvSpPr>
+          <p:cNvPr id="15" name="TextBox 14">
+            <a:extLst>
+              <a:ext uri="{FF2B5EF4-FFF2-40B4-BE49-F238E27FC236}">
+                <a16:creationId xmlns:a16="http://schemas.microsoft.com/office/drawing/2014/main" id="{D612AE1C-FE3D-4EDF-BACF-160BFFDD04AA}"/>
+              </a:ext>
+            </a:extLst>
+          </p:cNvPr>
+          <p:cNvSpPr txBox="1"/>
+          <p:nvPr/>
+        </p:nvSpPr>
+        <p:spPr>
+          <a:xfrm flipH="1">
+            <a:off x="2406674" y="1684057"/>
+            <a:ext cx="2868058" cy="1169551"/>
+          </a:xfrm>
+          <a:prstGeom prst="rect">
+            <a:avLst/>
+          </a:prstGeom>
+          <a:noFill/>
+          <a:ln>
+            <a:solidFill>
+              <a:srgbClr val="2B2B2B"/>
+            </a:solidFill>
+          </a:ln>
+        </p:spPr>
+        <p:txBody>
+          <a:bodyPr wrap="square" rtlCol="0">
+            <a:spAutoFit/>
+          </a:bodyPr>
+          <a:lstStyle/>
+          <a:p>
+            <a:pPr algn="ctr"/>
+            <a:endParaRPr lang="es-VE" dirty="0">
+              <a:latin typeface="Raleway" panose="020B0604020202020204" charset="0"/>
+            </a:endParaRPr>
+          </a:p>
+          <a:p>
+            <a:pPr algn="ctr"/>
+            <a:r>
+              <a:rPr lang="es-VE" dirty="0">
+                <a:latin typeface="Raleway" panose="020B0604020202020204" charset="0"/>
+              </a:rPr>
+              <a:t>No todas las personas del mundo pueden disfrutar de las ventajas de la tecnología</a:t>
+            </a:r>
+          </a:p>
+          <a:p>
+            <a:pPr algn="ctr"/>
+            <a:endParaRPr lang="es-VE" dirty="0">
+              <a:latin typeface="Raleway" panose="020B0604020202020204" charset="0"/>
+            </a:endParaRPr>
+          </a:p>
+        </p:txBody>
+      </p:sp>
+      <p:sp>
+        <p:nvSpPr>
+          <p:cNvPr id="16" name="TextBox 15">
+            <a:extLst>
+              <a:ext uri="{FF2B5EF4-FFF2-40B4-BE49-F238E27FC236}">
+                <a16:creationId xmlns:a16="http://schemas.microsoft.com/office/drawing/2014/main" id="{62183CC2-5040-4D7D-8566-C8B633A7D687}"/>
+              </a:ext>
+            </a:extLst>
+          </p:cNvPr>
+          <p:cNvSpPr txBox="1"/>
+          <p:nvPr/>
+        </p:nvSpPr>
+        <p:spPr>
+          <a:xfrm flipH="1">
+            <a:off x="6095053" y="1684057"/>
+            <a:ext cx="2868058" cy="1169551"/>
+          </a:xfrm>
+          <a:prstGeom prst="rect">
+            <a:avLst/>
+          </a:prstGeom>
+          <a:noFill/>
+          <a:ln>
+            <a:solidFill>
+              <a:srgbClr val="2B2B2B"/>
+            </a:solidFill>
+          </a:ln>
+        </p:spPr>
+        <p:txBody>
+          <a:bodyPr wrap="square" rtlCol="0">
+            <a:spAutoFit/>
+          </a:bodyPr>
+          <a:lstStyle/>
+          <a:p>
+            <a:pPr algn="ctr"/>
+            <a:endParaRPr lang="es-VE" dirty="0">
+              <a:latin typeface="Raleway" panose="020B0604020202020204" charset="0"/>
+            </a:endParaRPr>
+          </a:p>
+          <a:p>
+            <a:pPr algn="ctr"/>
+            <a:r>
+              <a:rPr lang="es-VE" dirty="0">
+                <a:latin typeface="Raleway" panose="020B0604020202020204" charset="0"/>
+              </a:rPr>
+              <a:t>Las herramientas de aprendizaje están limitados para aquellos sin acceso a Internet. </a:t>
+            </a:r>
+          </a:p>
+          <a:p>
+            <a:pPr algn="ctr"/>
+            <a:endParaRPr lang="es-VE" dirty="0">
+              <a:latin typeface="Raleway" panose="020B0604020202020204" charset="0"/>
+            </a:endParaRPr>
+          </a:p>
+        </p:txBody>
+      </p:sp>
+      <p:sp>
+        <p:nvSpPr>
+          <p:cNvPr id="9" name="TextBox 8">
+            <a:extLst>
+              <a:ext uri="{FF2B5EF4-FFF2-40B4-BE49-F238E27FC236}">
+                <a16:creationId xmlns:a16="http://schemas.microsoft.com/office/drawing/2014/main" id="{D7AB48C0-61F1-4F3B-A0A8-1F84EB3166CD}"/>
+              </a:ext>
+            </a:extLst>
+          </p:cNvPr>
+          <p:cNvSpPr txBox="1"/>
+          <p:nvPr/>
+        </p:nvSpPr>
+        <p:spPr>
+          <a:xfrm flipH="1">
+            <a:off x="131781" y="3387054"/>
+            <a:ext cx="1981044" cy="677108"/>
           </a:xfrm>
           <a:prstGeom prst="rect">
             <a:avLst/>
@@ -11507,28 +11715,29 @@
           <a:noFill/>
         </p:spPr>
         <p:txBody>
-          <a:bodyPr wrap="none" rtlCol="0">
+          <a:bodyPr wrap="square" rtlCol="0">
             <a:spAutoFit/>
           </a:bodyPr>
           <a:lstStyle/>
           <a:p>
-            <a:pPr algn="ctr"/>
             <a:r>
-              <a:rPr lang="es-VE" sz="1600" b="1" dirty="0">
+              <a:rPr lang="es-VE" b="1" dirty="0">
+                <a:solidFill>
+                  <a:srgbClr val="F7B617"/>
+                </a:solidFill>
                 <a:latin typeface="Raleway" panose="020B0604020202020204" charset="0"/>
               </a:rPr>
-              <a:t>¿Qué necesito saber/entender </a:t>
+              <a:t>Problema Central:</a:t>
             </a:r>
           </a:p>
           <a:p>
-            <a:pPr algn="ctr"/>
             <a:r>
-              <a:rPr lang="es-VE" sz="1600" b="1" dirty="0">
+              <a:rPr lang="es-VE" sz="1200" dirty="0">
                 <a:latin typeface="Raleway" panose="020B0604020202020204" charset="0"/>
               </a:rPr>
-              <a:t>para poder llegar al Árbol de Objetivos? </a:t>
+              <a:t>Define el tópico de nuestra investigación</a:t>
             </a:r>
-            <a:endParaRPr lang="en-US" sz="1600" b="1" dirty="0">
+            <a:endParaRPr lang="en-US" sz="1200" dirty="0">
               <a:latin typeface="Raleway" panose="020B0604020202020204" charset="0"/>
             </a:endParaRPr>
           </a:p>
@@ -11539,7 +11748,7 @@
           <p:cNvPr id="18" name="TextBox 17">
             <a:extLst>
               <a:ext uri="{FF2B5EF4-FFF2-40B4-BE49-F238E27FC236}">
-                <a16:creationId xmlns:a16="http://schemas.microsoft.com/office/drawing/2014/main" id="{A51019B1-BB53-4C5B-B45B-5A04C2AEE048}"/>
+                <a16:creationId xmlns:a16="http://schemas.microsoft.com/office/drawing/2014/main" id="{1C2BAAAC-F16C-41F5-A3EA-BE1C3A837574}"/>
               </a:ext>
             </a:extLst>
           </p:cNvPr>
@@ -11547,16 +11756,14 @@
           <p:nvPr/>
         </p:nvSpPr>
         <p:spPr>
-          <a:xfrm>
-            <a:off x="3169997" y="3798976"/>
-            <a:ext cx="2478771" cy="400110"/>
+          <a:xfrm flipH="1">
+            <a:off x="152123" y="1623390"/>
+            <a:ext cx="1981044" cy="1231106"/>
           </a:xfrm>
           <a:prstGeom prst="rect">
             <a:avLst/>
           </a:prstGeom>
-          <a:solidFill>
-            <a:srgbClr val="F7B617"/>
-          </a:solidFill>
+          <a:noFill/>
         </p:spPr>
         <p:txBody>
           <a:bodyPr wrap="square" rtlCol="0">
@@ -11564,20 +11771,24 @@
           </a:bodyPr>
           <a:lstStyle/>
           <a:p>
-            <a:pPr algn="ctr"/>
             <a:r>
-              <a:rPr lang="es-VE" sz="2000" dirty="0">
-                <a:solidFill>
-                  <a:schemeClr val="bg1"/>
+              <a:rPr lang="es-VE" b="1" dirty="0">
+                <a:solidFill>
+                  <a:srgbClr val="F7B617"/>
                 </a:solidFill>
                 <a:latin typeface="Raleway" panose="020B0604020202020204" charset="0"/>
               </a:rPr>
-              <a:t>Preguntas</a:t>
+              <a:t>Efectos</a:t>
             </a:r>
-            <a:endParaRPr lang="en-US" sz="2000" dirty="0">
-              <a:solidFill>
-                <a:schemeClr val="bg1"/>
-              </a:solidFill>
+          </a:p>
+          <a:p>
+            <a:r>
+              <a:rPr lang="es-VE" sz="1200" dirty="0">
+                <a:latin typeface="Raleway" panose="020B0604020202020204" charset="0"/>
+              </a:rPr>
+              <a:t>Nos recuerda porque es importante resolver este problema y nos permite medir el impacto de resolverlo. </a:t>
+            </a:r>
+            <a:endParaRPr lang="en-US" sz="1200" dirty="0">
               <a:latin typeface="Raleway" panose="020B0604020202020204" charset="0"/>
             </a:endParaRPr>
           </a:p>
@@ -11588,7 +11799,7 @@
           <p:cNvPr id="19" name="TextBox 18">
             <a:extLst>
               <a:ext uri="{FF2B5EF4-FFF2-40B4-BE49-F238E27FC236}">
-                <a16:creationId xmlns:a16="http://schemas.microsoft.com/office/drawing/2014/main" id="{BBBC80C9-0766-44BB-9A62-12F4BB65195F}"/>
+                <a16:creationId xmlns:a16="http://schemas.microsoft.com/office/drawing/2014/main" id="{EFD4F201-CEC9-4B92-8F92-20F99B683D21}"/>
               </a:ext>
             </a:extLst>
           </p:cNvPr>
@@ -11596,16 +11807,14 @@
           <p:nvPr/>
         </p:nvSpPr>
         <p:spPr>
-          <a:xfrm>
-            <a:off x="3262649" y="5889549"/>
-            <a:ext cx="2478771" cy="707886"/>
+          <a:xfrm flipH="1">
+            <a:off x="119524" y="5034809"/>
+            <a:ext cx="1993301" cy="1415772"/>
           </a:xfrm>
           <a:prstGeom prst="rect">
             <a:avLst/>
           </a:prstGeom>
-          <a:solidFill>
-            <a:srgbClr val="F7B617"/>
-          </a:solidFill>
+          <a:noFill/>
         </p:spPr>
         <p:txBody>
           <a:bodyPr wrap="square" rtlCol="0">
@@ -11613,29 +11822,265 @@
           </a:bodyPr>
           <a:lstStyle/>
           <a:p>
-            <a:pPr algn="ctr"/>
             <a:r>
-              <a:rPr lang="es-VE" sz="2000" dirty="0">
-                <a:solidFill>
-                  <a:schemeClr val="bg1"/>
+              <a:rPr lang="es-VE" b="1" dirty="0">
+                <a:solidFill>
+                  <a:srgbClr val="F7B617"/>
                 </a:solidFill>
                 <a:latin typeface="Raleway" panose="020B0604020202020204" charset="0"/>
               </a:rPr>
-              <a:t>Fuentes de Información</a:t>
+              <a:t>Causas:</a:t>
             </a:r>
-            <a:endParaRPr lang="en-US" sz="2000" dirty="0">
-              <a:solidFill>
-                <a:schemeClr val="bg1"/>
-              </a:solidFill>
+          </a:p>
+          <a:p>
+            <a:r>
+              <a:rPr lang="es-VE" sz="1200" dirty="0">
+                <a:latin typeface="Raleway" panose="020B0604020202020204" charset="0"/>
+              </a:rPr>
+              <a:t>Si entendemos las causas (y las visualizamos numéricamente) podemos dar soluciones al problema</a:t>
+            </a:r>
+            <a:endParaRPr lang="en-US" sz="1200" dirty="0">
               <a:latin typeface="Raleway" panose="020B0604020202020204" charset="0"/>
             </a:endParaRPr>
           </a:p>
         </p:txBody>
       </p:sp>
+      <p:cxnSp>
+        <p:nvCxnSpPr>
+          <p:cNvPr id="13" name="Connector: Elbow 12">
+            <a:extLst>
+              <a:ext uri="{FF2B5EF4-FFF2-40B4-BE49-F238E27FC236}">
+                <a16:creationId xmlns:a16="http://schemas.microsoft.com/office/drawing/2014/main" id="{3B0CEAA9-E436-46E5-85E8-D16BA3430032}"/>
+              </a:ext>
+            </a:extLst>
+          </p:cNvPr>
+          <p:cNvCxnSpPr>
+            <a:stCxn id="6" idx="0"/>
+            <a:endCxn id="2" idx="2"/>
+          </p:cNvCxnSpPr>
+          <p:nvPr/>
+        </p:nvCxnSpPr>
+        <p:spPr>
+          <a:xfrm rot="5400000" flipH="1" flipV="1">
+            <a:off x="4349339" y="3581671"/>
+            <a:ext cx="607999" cy="2175168"/>
+          </a:xfrm>
+          <a:prstGeom prst="bentConnector3">
+            <a:avLst/>
+          </a:prstGeom>
+          <a:ln>
+            <a:solidFill>
+              <a:srgbClr val="2B2B2B"/>
+            </a:solidFill>
+          </a:ln>
+        </p:spPr>
+        <p:style>
+          <a:lnRef idx="1">
+            <a:schemeClr val="accent1"/>
+          </a:lnRef>
+          <a:fillRef idx="0">
+            <a:schemeClr val="accent1"/>
+          </a:fillRef>
+          <a:effectRef idx="0">
+            <a:schemeClr val="accent1"/>
+          </a:effectRef>
+          <a:fontRef idx="minor">
+            <a:schemeClr val="tx1"/>
+          </a:fontRef>
+        </p:style>
+      </p:cxnSp>
+      <p:cxnSp>
+        <p:nvCxnSpPr>
+          <p:cNvPr id="22" name="Connector: Elbow 21">
+            <a:extLst>
+              <a:ext uri="{FF2B5EF4-FFF2-40B4-BE49-F238E27FC236}">
+                <a16:creationId xmlns:a16="http://schemas.microsoft.com/office/drawing/2014/main" id="{B24D75D0-0506-4952-B03F-DC6398C9E1A9}"/>
+              </a:ext>
+            </a:extLst>
+          </p:cNvPr>
+          <p:cNvCxnSpPr>
+            <a:cxnSpLocks/>
+            <a:stCxn id="12" idx="0"/>
+            <a:endCxn id="2" idx="2"/>
+          </p:cNvCxnSpPr>
+          <p:nvPr/>
+        </p:nvCxnSpPr>
+        <p:spPr>
+          <a:xfrm rot="16200000" flipV="1">
+            <a:off x="6500528" y="3605649"/>
+            <a:ext cx="608000" cy="2127212"/>
+          </a:xfrm>
+          <a:prstGeom prst="bentConnector3">
+            <a:avLst>
+              <a:gd name="adj1" fmla="val 50000"/>
+            </a:avLst>
+          </a:prstGeom>
+          <a:ln>
+            <a:solidFill>
+              <a:srgbClr val="2B2B2B"/>
+            </a:solidFill>
+          </a:ln>
+        </p:spPr>
+        <p:style>
+          <a:lnRef idx="1">
+            <a:schemeClr val="accent1"/>
+          </a:lnRef>
+          <a:fillRef idx="0">
+            <a:schemeClr val="accent1"/>
+          </a:fillRef>
+          <a:effectRef idx="0">
+            <a:schemeClr val="accent1"/>
+          </a:effectRef>
+          <a:fontRef idx="minor">
+            <a:schemeClr val="tx1"/>
+          </a:fontRef>
+        </p:style>
+      </p:cxnSp>
+      <p:cxnSp>
+        <p:nvCxnSpPr>
+          <p:cNvPr id="25" name="Connector: Elbow 24">
+            <a:extLst>
+              <a:ext uri="{FF2B5EF4-FFF2-40B4-BE49-F238E27FC236}">
+                <a16:creationId xmlns:a16="http://schemas.microsoft.com/office/drawing/2014/main" id="{C1FE0E60-DF3D-413B-8E7E-A4B6E3545DFE}"/>
+              </a:ext>
+            </a:extLst>
+          </p:cNvPr>
+          <p:cNvCxnSpPr>
+            <a:cxnSpLocks/>
+            <a:stCxn id="11" idx="0"/>
+            <a:endCxn id="2" idx="2"/>
+          </p:cNvCxnSpPr>
+          <p:nvPr/>
+        </p:nvCxnSpPr>
+        <p:spPr>
+          <a:xfrm rot="16200000" flipV="1">
+            <a:off x="5429158" y="4677019"/>
+            <a:ext cx="628242" cy="4713"/>
+          </a:xfrm>
+          <a:prstGeom prst="bentConnector3">
+            <a:avLst>
+              <a:gd name="adj1" fmla="val 50000"/>
+            </a:avLst>
+          </a:prstGeom>
+          <a:ln>
+            <a:solidFill>
+              <a:srgbClr val="2B2B2B"/>
+            </a:solidFill>
+          </a:ln>
+        </p:spPr>
+        <p:style>
+          <a:lnRef idx="1">
+            <a:schemeClr val="accent1"/>
+          </a:lnRef>
+          <a:fillRef idx="0">
+            <a:schemeClr val="accent1"/>
+          </a:fillRef>
+          <a:effectRef idx="0">
+            <a:schemeClr val="accent1"/>
+          </a:effectRef>
+          <a:fontRef idx="minor">
+            <a:schemeClr val="tx1"/>
+          </a:fontRef>
+        </p:style>
+      </p:cxnSp>
+      <p:cxnSp>
+        <p:nvCxnSpPr>
+          <p:cNvPr id="31" name="Connector: Elbow 30">
+            <a:extLst>
+              <a:ext uri="{FF2B5EF4-FFF2-40B4-BE49-F238E27FC236}">
+                <a16:creationId xmlns:a16="http://schemas.microsoft.com/office/drawing/2014/main" id="{2572DEFF-91EA-49E9-9379-6005C55543B5}"/>
+              </a:ext>
+            </a:extLst>
+          </p:cNvPr>
+          <p:cNvCxnSpPr>
+            <a:cxnSpLocks/>
+            <a:stCxn id="2" idx="0"/>
+            <a:endCxn id="15" idx="2"/>
+          </p:cNvCxnSpPr>
+          <p:nvPr/>
+        </p:nvCxnSpPr>
+        <p:spPr>
+          <a:xfrm rot="16200000" flipV="1">
+            <a:off x="4512043" y="2182268"/>
+            <a:ext cx="557540" cy="1900219"/>
+          </a:xfrm>
+          <a:prstGeom prst="bentConnector3">
+            <a:avLst>
+              <a:gd name="adj1" fmla="val 50000"/>
+            </a:avLst>
+          </a:prstGeom>
+          <a:ln>
+            <a:solidFill>
+              <a:srgbClr val="2B2B2B"/>
+            </a:solidFill>
+          </a:ln>
+        </p:spPr>
+        <p:style>
+          <a:lnRef idx="1">
+            <a:schemeClr val="accent1"/>
+          </a:lnRef>
+          <a:fillRef idx="0">
+            <a:schemeClr val="accent1"/>
+          </a:fillRef>
+          <a:effectRef idx="0">
+            <a:schemeClr val="accent1"/>
+          </a:effectRef>
+          <a:fontRef idx="minor">
+            <a:schemeClr val="tx1"/>
+          </a:fontRef>
+        </p:style>
+      </p:cxnSp>
+      <p:cxnSp>
+        <p:nvCxnSpPr>
+          <p:cNvPr id="34" name="Connector: Elbow 33">
+            <a:extLst>
+              <a:ext uri="{FF2B5EF4-FFF2-40B4-BE49-F238E27FC236}">
+                <a16:creationId xmlns:a16="http://schemas.microsoft.com/office/drawing/2014/main" id="{9305C3BD-47BA-4C7D-8167-1681CD7DAF4B}"/>
+              </a:ext>
+            </a:extLst>
+          </p:cNvPr>
+          <p:cNvCxnSpPr>
+            <a:cxnSpLocks/>
+            <a:stCxn id="2" idx="0"/>
+            <a:endCxn id="16" idx="2"/>
+          </p:cNvCxnSpPr>
+          <p:nvPr/>
+        </p:nvCxnSpPr>
+        <p:spPr>
+          <a:xfrm rot="5400000" flipH="1" flipV="1">
+            <a:off x="6356232" y="2238298"/>
+            <a:ext cx="557540" cy="1788160"/>
+          </a:xfrm>
+          <a:prstGeom prst="bentConnector3">
+            <a:avLst>
+              <a:gd name="adj1" fmla="val 50000"/>
+            </a:avLst>
+          </a:prstGeom>
+          <a:ln>
+            <a:solidFill>
+              <a:srgbClr val="2B2B2B"/>
+            </a:solidFill>
+          </a:ln>
+        </p:spPr>
+        <p:style>
+          <a:lnRef idx="1">
+            <a:schemeClr val="accent1"/>
+          </a:lnRef>
+          <a:fillRef idx="0">
+            <a:schemeClr val="accent1"/>
+          </a:fillRef>
+          <a:effectRef idx="0">
+            <a:schemeClr val="accent1"/>
+          </a:effectRef>
+          <a:fontRef idx="minor">
+            <a:schemeClr val="tx1"/>
+          </a:fontRef>
+        </p:style>
+      </p:cxnSp>
     </p:spTree>
     <p:extLst>
       <p:ext uri="{BB962C8B-B14F-4D97-AF65-F5344CB8AC3E}">
-        <p14:creationId xmlns:p14="http://schemas.microsoft.com/office/powerpoint/2010/main" val="1269151904"/>
+        <p14:creationId xmlns:p14="http://schemas.microsoft.com/office/powerpoint/2010/main" val="3888982255"/>
       </p:ext>
     </p:extLst>
   </p:cSld>
@@ -12531,6 +12976,585 @@
 </file>
 
 <file path=ppt/slides/slide5.xml><?xml version="1.0" encoding="utf-8"?>
+<p:sld xmlns:a="http://schemas.openxmlformats.org/drawingml/2006/main" xmlns:r="http://schemas.openxmlformats.org/officeDocument/2006/relationships" xmlns:p="http://schemas.openxmlformats.org/presentationml/2006/main">
+  <p:cSld>
+    <p:spTree>
+      <p:nvGrpSpPr>
+        <p:cNvPr id="1" name="Shape 392"/>
+        <p:cNvGrpSpPr/>
+        <p:nvPr/>
+      </p:nvGrpSpPr>
+      <p:grpSpPr>
+        <a:xfrm>
+          <a:off x="0" y="0"/>
+          <a:ext cx="0" cy="0"/>
+          <a:chOff x="0" y="0"/>
+          <a:chExt cx="0" cy="0"/>
+        </a:xfrm>
+      </p:grpSpPr>
+      <p:sp>
+        <p:nvSpPr>
+          <p:cNvPr id="20" name="Arrow: Right 19">
+            <a:extLst>
+              <a:ext uri="{FF2B5EF4-FFF2-40B4-BE49-F238E27FC236}">
+                <a16:creationId xmlns:a16="http://schemas.microsoft.com/office/drawing/2014/main" id="{52C69933-8020-40FB-B8BE-4F0CB57DFF0A}"/>
+              </a:ext>
+            </a:extLst>
+          </p:cNvPr>
+          <p:cNvSpPr/>
+          <p:nvPr/>
+        </p:nvSpPr>
+        <p:spPr>
+          <a:xfrm rot="5400000">
+            <a:off x="3462116" y="4571871"/>
+            <a:ext cx="1979371" cy="744717"/>
+          </a:xfrm>
+          <a:prstGeom prst="rightArrow">
+            <a:avLst/>
+          </a:prstGeom>
+          <a:solidFill>
+            <a:srgbClr val="2B2B2B"/>
+          </a:solidFill>
+          <a:ln>
+            <a:solidFill>
+              <a:srgbClr val="2B2B2B"/>
+            </a:solidFill>
+          </a:ln>
+        </p:spPr>
+        <p:style>
+          <a:lnRef idx="2">
+            <a:schemeClr val="accent1">
+              <a:shade val="50000"/>
+            </a:schemeClr>
+          </a:lnRef>
+          <a:fillRef idx="1">
+            <a:schemeClr val="accent1"/>
+          </a:fillRef>
+          <a:effectRef idx="0">
+            <a:schemeClr val="accent1"/>
+          </a:effectRef>
+          <a:fontRef idx="minor">
+            <a:schemeClr val="lt1"/>
+          </a:fontRef>
+        </p:style>
+        <p:txBody>
+          <a:bodyPr rtlCol="0" anchor="ctr"/>
+          <a:lstStyle/>
+          <a:p>
+            <a:pPr algn="ctr"/>
+            <a:endParaRPr lang="en-US"/>
+          </a:p>
+        </p:txBody>
+      </p:sp>
+      <p:sp>
+        <p:nvSpPr>
+          <p:cNvPr id="17" name="Arrow: Right 16">
+            <a:extLst>
+              <a:ext uri="{FF2B5EF4-FFF2-40B4-BE49-F238E27FC236}">
+                <a16:creationId xmlns:a16="http://schemas.microsoft.com/office/drawing/2014/main" id="{2952BF84-8BBC-44BF-804E-284292C55931}"/>
+              </a:ext>
+            </a:extLst>
+          </p:cNvPr>
+          <p:cNvSpPr/>
+          <p:nvPr/>
+        </p:nvSpPr>
+        <p:spPr>
+          <a:xfrm>
+            <a:off x="2941163" y="2081495"/>
+            <a:ext cx="3205113" cy="744717"/>
+          </a:xfrm>
+          <a:prstGeom prst="rightArrow">
+            <a:avLst/>
+          </a:prstGeom>
+          <a:solidFill>
+            <a:srgbClr val="2B2B2B"/>
+          </a:solidFill>
+          <a:ln>
+            <a:solidFill>
+              <a:srgbClr val="2B2B2B"/>
+            </a:solidFill>
+          </a:ln>
+        </p:spPr>
+        <p:style>
+          <a:lnRef idx="2">
+            <a:schemeClr val="accent1">
+              <a:shade val="50000"/>
+            </a:schemeClr>
+          </a:lnRef>
+          <a:fillRef idx="1">
+            <a:schemeClr val="accent1"/>
+          </a:fillRef>
+          <a:effectRef idx="0">
+            <a:schemeClr val="accent1"/>
+          </a:effectRef>
+          <a:fontRef idx="minor">
+            <a:schemeClr val="lt1"/>
+          </a:fontRef>
+        </p:style>
+        <p:txBody>
+          <a:bodyPr rtlCol="0" anchor="ctr"/>
+          <a:lstStyle/>
+          <a:p>
+            <a:pPr algn="ctr"/>
+            <a:endParaRPr lang="en-US"/>
+          </a:p>
+        </p:txBody>
+      </p:sp>
+      <p:sp>
+        <p:nvSpPr>
+          <p:cNvPr id="394" name="Shape 394"/>
+          <p:cNvSpPr txBox="1">
+            <a:spLocks noGrp="1"/>
+          </p:cNvSpPr>
+          <p:nvPr>
+            <p:ph type="title"/>
+          </p:nvPr>
+        </p:nvSpPr>
+        <p:spPr>
+          <a:xfrm>
+            <a:off x="666539" y="209956"/>
+            <a:ext cx="5192220" cy="428400"/>
+          </a:xfrm>
+          <a:prstGeom prst="rect">
+            <a:avLst/>
+          </a:prstGeom>
+          <a:noFill/>
+          <a:ln>
+            <a:noFill/>
+          </a:ln>
+        </p:spPr>
+        <p:txBody>
+          <a:bodyPr lIns="91425" tIns="45700" rIns="91425" bIns="45700" anchor="ctr" anchorCtr="0">
+            <a:noAutofit/>
+          </a:bodyPr>
+          <a:lstStyle/>
+          <a:p>
+            <a:pPr marL="0" marR="0" lvl="0" indent="0" algn="l" rtl="0">
+              <a:spcBef>
+                <a:spcPts val="0"/>
+              </a:spcBef>
+              <a:buClr>
+                <a:srgbClr val="F7B600"/>
+              </a:buClr>
+              <a:buSzPct val="25000"/>
+              <a:buFont typeface="Arial"/>
+              <a:buNone/>
+            </a:pPr>
+            <a:r>
+              <a:rPr lang="es-VE" sz="1200" dirty="0">
+                <a:solidFill>
+                  <a:srgbClr val="F7B600"/>
+                </a:solidFill>
+                <a:latin typeface="Montserrat"/>
+                <a:ea typeface="Montserrat"/>
+                <a:cs typeface="Montserrat"/>
+                <a:sym typeface="Montserrat"/>
+              </a:rPr>
+              <a:t>1</a:t>
+            </a:r>
+            <a:r>
+              <a:rPr lang="es-VE" sz="1200" i="0" u="none" strike="noStrike" cap="none" dirty="0">
+                <a:solidFill>
+                  <a:srgbClr val="F7B600"/>
+                </a:solidFill>
+                <a:latin typeface="Montserrat"/>
+                <a:ea typeface="Montserrat"/>
+                <a:cs typeface="Montserrat"/>
+                <a:sym typeface="Montserrat"/>
+              </a:rPr>
+              <a:t>.3 Formulación de la Pregunta</a:t>
+            </a:r>
+          </a:p>
+        </p:txBody>
+      </p:sp>
+      <p:pic>
+        <p:nvPicPr>
+          <p:cNvPr id="395" name="Shape 395" descr="isotipo codeacademy.png"/>
+          <p:cNvPicPr preferRelativeResize="0"/>
+          <p:nvPr/>
+        </p:nvPicPr>
+        <p:blipFill rotWithShape="1">
+          <a:blip r:embed="rId3">
+            <a:alphaModFix/>
+          </a:blip>
+          <a:srcRect/>
+          <a:stretch/>
+        </p:blipFill>
+        <p:spPr>
+          <a:xfrm>
+            <a:off x="131781" y="126082"/>
+            <a:ext cx="548100" cy="548100"/>
+          </a:xfrm>
+          <a:prstGeom prst="rect">
+            <a:avLst/>
+          </a:prstGeom>
+          <a:noFill/>
+          <a:ln>
+            <a:noFill/>
+          </a:ln>
+        </p:spPr>
+      </p:pic>
+      <p:sp>
+        <p:nvSpPr>
+          <p:cNvPr id="396" name="Shape 396"/>
+          <p:cNvSpPr txBox="1"/>
+          <p:nvPr/>
+        </p:nvSpPr>
+        <p:spPr>
+          <a:xfrm>
+            <a:off x="1117077" y="674182"/>
+            <a:ext cx="7107810" cy="646200"/>
+          </a:xfrm>
+          <a:prstGeom prst="rect">
+            <a:avLst/>
+          </a:prstGeom>
+          <a:noFill/>
+          <a:ln>
+            <a:noFill/>
+          </a:ln>
+        </p:spPr>
+        <p:txBody>
+          <a:bodyPr lIns="91425" tIns="45700" rIns="91425" bIns="45700" anchor="t" anchorCtr="0">
+            <a:noAutofit/>
+          </a:bodyPr>
+          <a:lstStyle/>
+          <a:p>
+            <a:pPr marL="0" marR="0" lvl="0" indent="0" algn="l" rtl="0">
+              <a:spcBef>
+                <a:spcPts val="0"/>
+              </a:spcBef>
+              <a:buSzPct val="25000"/>
+              <a:buNone/>
+            </a:pPr>
+            <a:r>
+              <a:rPr lang="es-GT" sz="3600" dirty="0">
+                <a:solidFill>
+                  <a:srgbClr val="F7B600"/>
+                </a:solidFill>
+                <a:latin typeface="Raleway"/>
+                <a:ea typeface="Raleway"/>
+                <a:cs typeface="Raleway"/>
+                <a:sym typeface="Raleway"/>
+              </a:rPr>
+              <a:t>¿</a:t>
+            </a:r>
+            <a:r>
+              <a:rPr lang="es-GT" sz="3600" b="0" i="0" u="none" strike="noStrike" cap="none" dirty="0">
+                <a:solidFill>
+                  <a:srgbClr val="F7B600"/>
+                </a:solidFill>
+                <a:latin typeface="Raleway"/>
+                <a:ea typeface="Raleway"/>
+                <a:cs typeface="Raleway"/>
+                <a:sym typeface="Raleway"/>
+              </a:rPr>
+              <a:t>Cómo formular la pregunta?</a:t>
+            </a:r>
+          </a:p>
+        </p:txBody>
+      </p:sp>
+      <p:sp>
+        <p:nvSpPr>
+          <p:cNvPr id="12" name="TextBox 11">
+            <a:extLst>
+              <a:ext uri="{FF2B5EF4-FFF2-40B4-BE49-F238E27FC236}">
+                <a16:creationId xmlns:a16="http://schemas.microsoft.com/office/drawing/2014/main" id="{2609CE3E-E741-4F5A-BE89-CF17541F2D1B}"/>
+              </a:ext>
+            </a:extLst>
+          </p:cNvPr>
+          <p:cNvSpPr txBox="1"/>
+          <p:nvPr/>
+        </p:nvSpPr>
+        <p:spPr>
+          <a:xfrm>
+            <a:off x="179587" y="2130456"/>
+            <a:ext cx="2478771" cy="707886"/>
+          </a:xfrm>
+          <a:prstGeom prst="rect">
+            <a:avLst/>
+          </a:prstGeom>
+          <a:solidFill>
+            <a:srgbClr val="F7B617"/>
+          </a:solidFill>
+        </p:spPr>
+        <p:txBody>
+          <a:bodyPr wrap="square" rtlCol="0">
+            <a:spAutoFit/>
+          </a:bodyPr>
+          <a:lstStyle/>
+          <a:p>
+            <a:pPr algn="ctr"/>
+            <a:r>
+              <a:rPr lang="es-VE" sz="2000" dirty="0">
+                <a:solidFill>
+                  <a:schemeClr val="bg1"/>
+                </a:solidFill>
+                <a:latin typeface="Raleway" panose="020B0604020202020204" charset="0"/>
+              </a:rPr>
+              <a:t>Árbol de Problemas</a:t>
+            </a:r>
+            <a:endParaRPr lang="en-US" sz="2000" dirty="0">
+              <a:solidFill>
+                <a:schemeClr val="bg1"/>
+              </a:solidFill>
+              <a:latin typeface="Raleway" panose="020B0604020202020204" charset="0"/>
+            </a:endParaRPr>
+          </a:p>
+        </p:txBody>
+      </p:sp>
+      <p:sp>
+        <p:nvSpPr>
+          <p:cNvPr id="13" name="TextBox 12">
+            <a:extLst>
+              <a:ext uri="{FF2B5EF4-FFF2-40B4-BE49-F238E27FC236}">
+                <a16:creationId xmlns:a16="http://schemas.microsoft.com/office/drawing/2014/main" id="{CD270FE8-0E34-42E8-9C64-4AA97E116070}"/>
+              </a:ext>
+            </a:extLst>
+          </p:cNvPr>
+          <p:cNvSpPr txBox="1"/>
+          <p:nvPr/>
+        </p:nvSpPr>
+        <p:spPr>
+          <a:xfrm>
+            <a:off x="6572532" y="2130456"/>
+            <a:ext cx="2478771" cy="707886"/>
+          </a:xfrm>
+          <a:prstGeom prst="rect">
+            <a:avLst/>
+          </a:prstGeom>
+          <a:solidFill>
+            <a:srgbClr val="F7B617"/>
+          </a:solidFill>
+        </p:spPr>
+        <p:txBody>
+          <a:bodyPr wrap="square" rtlCol="0">
+            <a:spAutoFit/>
+          </a:bodyPr>
+          <a:lstStyle/>
+          <a:p>
+            <a:pPr algn="ctr"/>
+            <a:r>
+              <a:rPr lang="es-VE" sz="2000" dirty="0">
+                <a:solidFill>
+                  <a:schemeClr val="bg1"/>
+                </a:solidFill>
+                <a:latin typeface="Raleway" panose="020B0604020202020204" charset="0"/>
+              </a:rPr>
+              <a:t>Árbol de </a:t>
+            </a:r>
+          </a:p>
+          <a:p>
+            <a:pPr algn="ctr"/>
+            <a:r>
+              <a:rPr lang="es-VE" sz="2000" dirty="0">
+                <a:solidFill>
+                  <a:schemeClr val="bg1"/>
+                </a:solidFill>
+                <a:latin typeface="Raleway" panose="020B0604020202020204" charset="0"/>
+              </a:rPr>
+              <a:t>Objetivos</a:t>
+            </a:r>
+            <a:endParaRPr lang="en-US" sz="2000" dirty="0">
+              <a:solidFill>
+                <a:schemeClr val="bg1"/>
+              </a:solidFill>
+              <a:latin typeface="Raleway" panose="020B0604020202020204" charset="0"/>
+            </a:endParaRPr>
+          </a:p>
+        </p:txBody>
+      </p:sp>
+      <p:pic>
+        <p:nvPicPr>
+          <p:cNvPr id="9" name="Picture 8" descr="A picture containing thing&#10;&#10;Description generated with very high confidence">
+            <a:extLst>
+              <a:ext uri="{FF2B5EF4-FFF2-40B4-BE49-F238E27FC236}">
+                <a16:creationId xmlns:a16="http://schemas.microsoft.com/office/drawing/2014/main" id="{B5E32F36-C4F8-4662-885F-6A005C4F699E}"/>
+              </a:ext>
+            </a:extLst>
+          </p:cNvPr>
+          <p:cNvPicPr>
+            <a:picLocks noChangeAspect="1"/>
+          </p:cNvPicPr>
+          <p:nvPr/>
+        </p:nvPicPr>
+        <p:blipFill>
+          <a:blip r:embed="rId4"/>
+          <a:stretch>
+            <a:fillRect/>
+          </a:stretch>
+        </p:blipFill>
+        <p:spPr>
+          <a:xfrm>
+            <a:off x="3645812" y="1475295"/>
+            <a:ext cx="1611984" cy="1611984"/>
+          </a:xfrm>
+          <a:prstGeom prst="rect">
+            <a:avLst/>
+          </a:prstGeom>
+        </p:spPr>
+      </p:pic>
+      <p:sp>
+        <p:nvSpPr>
+          <p:cNvPr id="10" name="TextBox 9">
+            <a:extLst>
+              <a:ext uri="{FF2B5EF4-FFF2-40B4-BE49-F238E27FC236}">
+                <a16:creationId xmlns:a16="http://schemas.microsoft.com/office/drawing/2014/main" id="{6878E5A1-0E3B-48AE-A19A-BF1630840705}"/>
+              </a:ext>
+            </a:extLst>
+          </p:cNvPr>
+          <p:cNvSpPr txBox="1"/>
+          <p:nvPr/>
+        </p:nvSpPr>
+        <p:spPr>
+          <a:xfrm>
+            <a:off x="2511175" y="3120234"/>
+            <a:ext cx="4160113" cy="584775"/>
+          </a:xfrm>
+          <a:prstGeom prst="rect">
+            <a:avLst/>
+          </a:prstGeom>
+          <a:noFill/>
+        </p:spPr>
+        <p:txBody>
+          <a:bodyPr wrap="none" rtlCol="0">
+            <a:spAutoFit/>
+          </a:bodyPr>
+          <a:lstStyle/>
+          <a:p>
+            <a:pPr algn="ctr"/>
+            <a:r>
+              <a:rPr lang="es-VE" sz="1600" b="1" dirty="0">
+                <a:latin typeface="Raleway" panose="020B0604020202020204" charset="0"/>
+              </a:rPr>
+              <a:t>¿Qué necesito saber/entender </a:t>
+            </a:r>
+          </a:p>
+          <a:p>
+            <a:pPr algn="ctr"/>
+            <a:r>
+              <a:rPr lang="es-VE" sz="1600" b="1" dirty="0">
+                <a:latin typeface="Raleway" panose="020B0604020202020204" charset="0"/>
+              </a:rPr>
+              <a:t>para poder llegar al Árbol de Objetivos? </a:t>
+            </a:r>
+            <a:endParaRPr lang="en-US" sz="1600" b="1" dirty="0">
+              <a:latin typeface="Raleway" panose="020B0604020202020204" charset="0"/>
+            </a:endParaRPr>
+          </a:p>
+        </p:txBody>
+      </p:sp>
+      <p:sp>
+        <p:nvSpPr>
+          <p:cNvPr id="18" name="TextBox 17">
+            <a:extLst>
+              <a:ext uri="{FF2B5EF4-FFF2-40B4-BE49-F238E27FC236}">
+                <a16:creationId xmlns:a16="http://schemas.microsoft.com/office/drawing/2014/main" id="{A51019B1-BB53-4C5B-B45B-5A04C2AEE048}"/>
+              </a:ext>
+            </a:extLst>
+          </p:cNvPr>
+          <p:cNvSpPr txBox="1"/>
+          <p:nvPr/>
+        </p:nvSpPr>
+        <p:spPr>
+          <a:xfrm>
+            <a:off x="3169997" y="3798976"/>
+            <a:ext cx="2478771" cy="400110"/>
+          </a:xfrm>
+          <a:prstGeom prst="rect">
+            <a:avLst/>
+          </a:prstGeom>
+          <a:solidFill>
+            <a:srgbClr val="F7B617"/>
+          </a:solidFill>
+        </p:spPr>
+        <p:txBody>
+          <a:bodyPr wrap="square" rtlCol="0">
+            <a:spAutoFit/>
+          </a:bodyPr>
+          <a:lstStyle/>
+          <a:p>
+            <a:pPr algn="ctr"/>
+            <a:r>
+              <a:rPr lang="es-VE" sz="2000" dirty="0">
+                <a:solidFill>
+                  <a:schemeClr val="bg1"/>
+                </a:solidFill>
+                <a:latin typeface="Raleway" panose="020B0604020202020204" charset="0"/>
+              </a:rPr>
+              <a:t>Preguntas</a:t>
+            </a:r>
+            <a:endParaRPr lang="en-US" sz="2000" dirty="0">
+              <a:solidFill>
+                <a:schemeClr val="bg1"/>
+              </a:solidFill>
+              <a:latin typeface="Raleway" panose="020B0604020202020204" charset="0"/>
+            </a:endParaRPr>
+          </a:p>
+        </p:txBody>
+      </p:sp>
+      <p:sp>
+        <p:nvSpPr>
+          <p:cNvPr id="19" name="TextBox 18">
+            <a:extLst>
+              <a:ext uri="{FF2B5EF4-FFF2-40B4-BE49-F238E27FC236}">
+                <a16:creationId xmlns:a16="http://schemas.microsoft.com/office/drawing/2014/main" id="{BBBC80C9-0766-44BB-9A62-12F4BB65195F}"/>
+              </a:ext>
+            </a:extLst>
+          </p:cNvPr>
+          <p:cNvSpPr txBox="1"/>
+          <p:nvPr/>
+        </p:nvSpPr>
+        <p:spPr>
+          <a:xfrm>
+            <a:off x="3262649" y="5889549"/>
+            <a:ext cx="2478771" cy="707886"/>
+          </a:xfrm>
+          <a:prstGeom prst="rect">
+            <a:avLst/>
+          </a:prstGeom>
+          <a:solidFill>
+            <a:srgbClr val="F7B617"/>
+          </a:solidFill>
+        </p:spPr>
+        <p:txBody>
+          <a:bodyPr wrap="square" rtlCol="0">
+            <a:spAutoFit/>
+          </a:bodyPr>
+          <a:lstStyle/>
+          <a:p>
+            <a:pPr algn="ctr"/>
+            <a:r>
+              <a:rPr lang="es-VE" sz="2000" dirty="0">
+                <a:solidFill>
+                  <a:schemeClr val="bg1"/>
+                </a:solidFill>
+                <a:latin typeface="Raleway" panose="020B0604020202020204" charset="0"/>
+              </a:rPr>
+              <a:t>Fuentes de Información</a:t>
+            </a:r>
+            <a:endParaRPr lang="en-US" sz="2000" dirty="0">
+              <a:solidFill>
+                <a:schemeClr val="bg1"/>
+              </a:solidFill>
+              <a:latin typeface="Raleway" panose="020B0604020202020204" charset="0"/>
+            </a:endParaRPr>
+          </a:p>
+        </p:txBody>
+      </p:sp>
+    </p:spTree>
+    <p:extLst>
+      <p:ext uri="{BB962C8B-B14F-4D97-AF65-F5344CB8AC3E}">
+        <p14:creationId xmlns:p14="http://schemas.microsoft.com/office/powerpoint/2010/main" val="1269151904"/>
+      </p:ext>
+    </p:extLst>
+  </p:cSld>
+  <p:clrMapOvr>
+    <a:masterClrMapping/>
+  </p:clrMapOvr>
+</p:sld>
+</file>
+
+<file path=ppt/slides/slide6.xml><?xml version="1.0" encoding="utf-8"?>
 <p:sld xmlns:a="http://schemas.openxmlformats.org/drawingml/2006/main" xmlns:r="http://schemas.openxmlformats.org/officeDocument/2006/relationships" xmlns:p="http://schemas.openxmlformats.org/presentationml/2006/main">
   <p:cSld>
     <p:spTree>

</xml_diff>